<commit_message>
netload_optimization.py upload with working functions but sometimes solution infeasible
</commit_message>
<xml_diff>
--- a/ResultDemonstration/ResearchUpdate_Jan.26.pptx
+++ b/ResultDemonstration/ResearchUpdate_Jan.26.pptx
@@ -5,7 +5,7 @@
     <p:sldMasterId id="2147483648" r:id="rId1"/>
   </p:sldMasterIdLst>
   <p:notesMasterIdLst>
-    <p:notesMasterId r:id="rId11"/>
+    <p:notesMasterId r:id="rId12"/>
   </p:notesMasterIdLst>
   <p:sldIdLst>
     <p:sldId id="256" r:id="rId2"/>
@@ -15,8 +15,9 @@
     <p:sldId id="264" r:id="rId6"/>
     <p:sldId id="260" r:id="rId7"/>
     <p:sldId id="266" r:id="rId8"/>
-    <p:sldId id="262" r:id="rId9"/>
-    <p:sldId id="261" r:id="rId10"/>
+    <p:sldId id="268" r:id="rId9"/>
+    <p:sldId id="262" r:id="rId10"/>
+    <p:sldId id="261" r:id="rId11"/>
   </p:sldIdLst>
   <p:sldSz cx="12192000" cy="6858000"/>
   <p:notesSz cx="6858000" cy="9144000"/>
@@ -205,7 +206,7 @@
           <a:p>
             <a:fld id="{C4580B0E-0467-494A-9862-D4CCF195C03F}" type="datetimeFigureOut">
               <a:rPr lang="en-US" smtClean="0"/>
-              <a:t>2/1/21</a:t>
+              <a:t>2/2/21</a:t>
             </a:fld>
             <a:endParaRPr lang="en-US"/>
           </a:p>
@@ -703,7 +704,7 @@
           <a:p>
             <a:fld id="{39E8E000-5240-6B45-BFEA-AAE01C3F9EB9}" type="datetimeFigureOut">
               <a:rPr lang="en-US" smtClean="0"/>
-              <a:t>2/1/21</a:t>
+              <a:t>2/2/21</a:t>
             </a:fld>
             <a:endParaRPr lang="en-US"/>
           </a:p>
@@ -901,7 +902,7 @@
           <a:p>
             <a:fld id="{39E8E000-5240-6B45-BFEA-AAE01C3F9EB9}" type="datetimeFigureOut">
               <a:rPr lang="en-US" smtClean="0"/>
-              <a:t>2/1/21</a:t>
+              <a:t>2/2/21</a:t>
             </a:fld>
             <a:endParaRPr lang="en-US"/>
           </a:p>
@@ -1109,7 +1110,7 @@
           <a:p>
             <a:fld id="{39E8E000-5240-6B45-BFEA-AAE01C3F9EB9}" type="datetimeFigureOut">
               <a:rPr lang="en-US" smtClean="0"/>
-              <a:t>2/1/21</a:t>
+              <a:t>2/2/21</a:t>
             </a:fld>
             <a:endParaRPr lang="en-US"/>
           </a:p>
@@ -1307,7 +1308,7 @@
           <a:p>
             <a:fld id="{39E8E000-5240-6B45-BFEA-AAE01C3F9EB9}" type="datetimeFigureOut">
               <a:rPr lang="en-US" smtClean="0"/>
-              <a:t>2/1/21</a:t>
+              <a:t>2/2/21</a:t>
             </a:fld>
             <a:endParaRPr lang="en-US"/>
           </a:p>
@@ -1582,7 +1583,7 @@
           <a:p>
             <a:fld id="{39E8E000-5240-6B45-BFEA-AAE01C3F9EB9}" type="datetimeFigureOut">
               <a:rPr lang="en-US" smtClean="0"/>
-              <a:t>2/1/21</a:t>
+              <a:t>2/2/21</a:t>
             </a:fld>
             <a:endParaRPr lang="en-US"/>
           </a:p>
@@ -1847,7 +1848,7 @@
           <a:p>
             <a:fld id="{39E8E000-5240-6B45-BFEA-AAE01C3F9EB9}" type="datetimeFigureOut">
               <a:rPr lang="en-US" smtClean="0"/>
-              <a:t>2/1/21</a:t>
+              <a:t>2/2/21</a:t>
             </a:fld>
             <a:endParaRPr lang="en-US"/>
           </a:p>
@@ -2259,7 +2260,7 @@
           <a:p>
             <a:fld id="{39E8E000-5240-6B45-BFEA-AAE01C3F9EB9}" type="datetimeFigureOut">
               <a:rPr lang="en-US" smtClean="0"/>
-              <a:t>2/1/21</a:t>
+              <a:t>2/2/21</a:t>
             </a:fld>
             <a:endParaRPr lang="en-US"/>
           </a:p>
@@ -2400,7 +2401,7 @@
           <a:p>
             <a:fld id="{39E8E000-5240-6B45-BFEA-AAE01C3F9EB9}" type="datetimeFigureOut">
               <a:rPr lang="en-US" smtClean="0"/>
-              <a:t>2/1/21</a:t>
+              <a:t>2/2/21</a:t>
             </a:fld>
             <a:endParaRPr lang="en-US"/>
           </a:p>
@@ -2513,7 +2514,7 @@
           <a:p>
             <a:fld id="{39E8E000-5240-6B45-BFEA-AAE01C3F9EB9}" type="datetimeFigureOut">
               <a:rPr lang="en-US" smtClean="0"/>
-              <a:t>2/1/21</a:t>
+              <a:t>2/2/21</a:t>
             </a:fld>
             <a:endParaRPr lang="en-US"/>
           </a:p>
@@ -2824,7 +2825,7 @@
           <a:p>
             <a:fld id="{39E8E000-5240-6B45-BFEA-AAE01C3F9EB9}" type="datetimeFigureOut">
               <a:rPr lang="en-US" smtClean="0"/>
-              <a:t>2/1/21</a:t>
+              <a:t>2/2/21</a:t>
             </a:fld>
             <a:endParaRPr lang="en-US"/>
           </a:p>
@@ -3112,7 +3113,7 @@
           <a:p>
             <a:fld id="{39E8E000-5240-6B45-BFEA-AAE01C3F9EB9}" type="datetimeFigureOut">
               <a:rPr lang="en-US" smtClean="0"/>
-              <a:t>2/1/21</a:t>
+              <a:t>2/2/21</a:t>
             </a:fld>
             <a:endParaRPr lang="en-US"/>
           </a:p>
@@ -3353,7 +3354,7 @@
           <a:p>
             <a:fld id="{39E8E000-5240-6B45-BFEA-AAE01C3F9EB9}" type="datetimeFigureOut">
               <a:rPr lang="en-US" smtClean="0"/>
-              <a:t>2/1/21</a:t>
+              <a:t>2/2/21</a:t>
             </a:fld>
             <a:endParaRPr lang="en-US"/>
           </a:p>
@@ -3839,6 +3840,155 @@
 </p:sld>
 </file>
 
+<file path=ppt/slides/slide10.xml><?xml version="1.0" encoding="utf-8"?>
+<p:sld xmlns:a="http://schemas.openxmlformats.org/drawingml/2006/main" xmlns:r="http://schemas.openxmlformats.org/officeDocument/2006/relationships" xmlns:p="http://schemas.openxmlformats.org/presentationml/2006/main">
+  <p:cSld>
+    <p:spTree>
+      <p:nvGrpSpPr>
+        <p:cNvPr id="1" name=""/>
+        <p:cNvGrpSpPr/>
+        <p:nvPr/>
+      </p:nvGrpSpPr>
+      <p:grpSpPr>
+        <a:xfrm>
+          <a:off x="0" y="0"/>
+          <a:ext cx="0" cy="0"/>
+          <a:chOff x="0" y="0"/>
+          <a:chExt cx="0" cy="0"/>
+        </a:xfrm>
+      </p:grpSpPr>
+      <p:sp>
+        <p:nvSpPr>
+          <p:cNvPr id="2" name="Title 1">
+            <a:extLst>
+              <a:ext uri="{FF2B5EF4-FFF2-40B4-BE49-F238E27FC236}">
+                <a16:creationId xmlns:a16="http://schemas.microsoft.com/office/drawing/2014/main" id="{F7A0676D-85F6-6A45-B13D-B6F3660769C1}"/>
+              </a:ext>
+            </a:extLst>
+          </p:cNvPr>
+          <p:cNvSpPr>
+            <a:spLocks noGrp="1"/>
+          </p:cNvSpPr>
+          <p:nvPr>
+            <p:ph type="title"/>
+          </p:nvPr>
+        </p:nvSpPr>
+        <p:spPr/>
+        <p:txBody>
+          <a:bodyPr/>
+          <a:lstStyle/>
+          <a:p>
+            <a:r>
+              <a:rPr lang="en-US" dirty="0"/>
+              <a:t>Research Plan</a:t>
+            </a:r>
+          </a:p>
+        </p:txBody>
+      </p:sp>
+      <p:sp>
+        <p:nvSpPr>
+          <p:cNvPr id="3" name="Content Placeholder 2">
+            <a:extLst>
+              <a:ext uri="{FF2B5EF4-FFF2-40B4-BE49-F238E27FC236}">
+                <a16:creationId xmlns:a16="http://schemas.microsoft.com/office/drawing/2014/main" id="{38AB196A-6CC0-824C-B204-E34D59126EE8}"/>
+              </a:ext>
+            </a:extLst>
+          </p:cNvPr>
+          <p:cNvSpPr>
+            <a:spLocks noGrp="1"/>
+          </p:cNvSpPr>
+          <p:nvPr>
+            <p:ph idx="1"/>
+          </p:nvPr>
+        </p:nvSpPr>
+        <p:spPr>
+          <a:xfrm>
+            <a:off x="838200" y="1825625"/>
+            <a:ext cx="11049000" cy="4351338"/>
+          </a:xfrm>
+        </p:spPr>
+        <p:txBody>
+          <a:bodyPr>
+            <a:normAutofit fontScale="92500" lnSpcReduction="10000"/>
+          </a:bodyPr>
+          <a:lstStyle/>
+          <a:p>
+            <a:r>
+              <a:rPr lang="en-US" dirty="0"/>
+              <a:t>Dec.9 –Dec.16: finish validation, think about sensitivity implementation</a:t>
+            </a:r>
+          </a:p>
+          <a:p>
+            <a:r>
+              <a:rPr lang="en-US" dirty="0"/>
+              <a:t>Dec.16-Dec.23: sensitivity design and implementation, methods write up</a:t>
+            </a:r>
+          </a:p>
+          <a:p>
+            <a:r>
+              <a:rPr lang="en-US" dirty="0"/>
+              <a:t>Dec.23-Jan.6: running sensitivity</a:t>
+            </a:r>
+          </a:p>
+          <a:p>
+            <a:r>
+              <a:rPr lang="en-US" dirty="0"/>
+              <a:t>Jan.6-Jan.13: sensitivity result, results write up</a:t>
+            </a:r>
+          </a:p>
+          <a:p>
+            <a:pPr marL="0" indent="0">
+              <a:buNone/>
+            </a:pPr>
+            <a:endParaRPr lang="en-US" dirty="0"/>
+          </a:p>
+          <a:p>
+            <a:r>
+              <a:rPr lang="en-US" altLang="zh-CN" dirty="0"/>
+              <a:t>Total .</a:t>
+            </a:r>
+            <a:r>
+              <a:rPr lang="en-US" dirty="0"/>
+              <a:t>Hydro power, it’s okay</a:t>
+            </a:r>
+          </a:p>
+          <a:p>
+            <a:r>
+              <a:rPr lang="en-US" dirty="0"/>
+              <a:t>Do annual generation check, after the validation, and run the sensitivity:</a:t>
+            </a:r>
+          </a:p>
+          <a:p>
+            <a:pPr lvl="1"/>
+            <a:r>
+              <a:rPr lang="en-US" dirty="0"/>
+              <a:t>More renewables, and </a:t>
+            </a:r>
+          </a:p>
+          <a:p>
+            <a:r>
+              <a:rPr lang="en-US" dirty="0"/>
+              <a:t>Friday, we give validation result, 3pm, how to set up. Super Computer arch guide, might not make sense, send you directions.</a:t>
+            </a:r>
+          </a:p>
+          <a:p>
+            <a:endParaRPr lang="en-US" dirty="0"/>
+          </a:p>
+        </p:txBody>
+      </p:sp>
+    </p:spTree>
+    <p:extLst>
+      <p:ext uri="{BB962C8B-B14F-4D97-AF65-F5344CB8AC3E}">
+        <p14:creationId xmlns:p14="http://schemas.microsoft.com/office/powerpoint/2010/main" val="1708910471"/>
+      </p:ext>
+    </p:extLst>
+  </p:cSld>
+  <p:clrMapOvr>
+    <a:masterClrMapping/>
+  </p:clrMapOvr>
+</p:sld>
+</file>
+
 <file path=ppt/slides/slide2.xml><?xml version="1.0" encoding="utf-8"?>
 <p:sld xmlns:a="http://schemas.openxmlformats.org/drawingml/2006/main" xmlns:r="http://schemas.openxmlformats.org/officeDocument/2006/relationships" xmlns:p="http://schemas.openxmlformats.org/presentationml/2006/main">
   <p:cSld>
@@ -4637,7 +4787,7 @@
           <p:nvPr>
             <p:extLst>
               <p:ext uri="{D42A27DB-BD31-4B8C-83A1-F6EECF244321}">
-                <p14:modId xmlns:p14="http://schemas.microsoft.com/office/powerpoint/2010/main" val="490308076"/>
+                <p14:modId xmlns:p14="http://schemas.microsoft.com/office/powerpoint/2010/main" val="357475754"/>
               </p:ext>
             </p:extLst>
           </p:nvPr>
@@ -4695,7 +4845,7 @@
                     <a:bodyPr/>
                     <a:lstStyle/>
                     <a:p>
-                      <a:endParaRPr lang="en-US"/>
+                      <a:endParaRPr lang="en-US" dirty="0"/>
                     </a:p>
                   </a:txBody>
                   <a:tcPr/>
@@ -4777,10 +4927,7 @@
                     <a:bodyPr/>
                     <a:lstStyle/>
                     <a:p>
-                      <a:r>
-                        <a:rPr lang="en-US" dirty="0"/>
-                        <a:t>1.3m</a:t>
-                      </a:r>
+                      <a:endParaRPr lang="en-US" dirty="0"/>
                     </a:p>
                   </a:txBody>
                   <a:tcPr/>
@@ -4848,7 +4995,7 @@
                     <a:p>
                       <a:r>
                         <a:rPr lang="en-US" dirty="0"/>
-                        <a:t>1.5m</a:t>
+                        <a:t>1.3m</a:t>
                       </a:r>
                     </a:p>
                   </a:txBody>
@@ -5211,6 +5358,88 @@
           <p:cNvPr id="2" name="Title 1">
             <a:extLst>
               <a:ext uri="{FF2B5EF4-FFF2-40B4-BE49-F238E27FC236}">
+                <a16:creationId xmlns:a16="http://schemas.microsoft.com/office/drawing/2014/main" id="{4BB7C090-5720-F844-B492-DF26AA2C3D9B}"/>
+              </a:ext>
+            </a:extLst>
+          </p:cNvPr>
+          <p:cNvSpPr>
+            <a:spLocks noGrp="1"/>
+          </p:cNvSpPr>
+          <p:nvPr>
+            <p:ph type="title"/>
+          </p:nvPr>
+        </p:nvSpPr>
+        <p:spPr/>
+        <p:txBody>
+          <a:bodyPr/>
+          <a:lstStyle/>
+          <a:p>
+            <a:endParaRPr lang="en-US" dirty="0"/>
+          </a:p>
+        </p:txBody>
+      </p:sp>
+      <p:sp>
+        <p:nvSpPr>
+          <p:cNvPr id="3" name="Content Placeholder 2">
+            <a:extLst>
+              <a:ext uri="{FF2B5EF4-FFF2-40B4-BE49-F238E27FC236}">
+                <a16:creationId xmlns:a16="http://schemas.microsoft.com/office/drawing/2014/main" id="{CEAA4221-9149-214D-AEB0-19990F10008D}"/>
+              </a:ext>
+            </a:extLst>
+          </p:cNvPr>
+          <p:cNvSpPr>
+            <a:spLocks noGrp="1"/>
+          </p:cNvSpPr>
+          <p:nvPr>
+            <p:ph idx="1"/>
+          </p:nvPr>
+        </p:nvSpPr>
+        <p:spPr/>
+        <p:txBody>
+          <a:bodyPr>
+            <a:normAutofit/>
+          </a:bodyPr>
+          <a:lstStyle/>
+          <a:p>
+            <a:endParaRPr lang="en-US" dirty="0"/>
+          </a:p>
+        </p:txBody>
+      </p:sp>
+    </p:spTree>
+    <p:extLst>
+      <p:ext uri="{BB962C8B-B14F-4D97-AF65-F5344CB8AC3E}">
+        <p14:creationId xmlns:p14="http://schemas.microsoft.com/office/powerpoint/2010/main" val="2162809456"/>
+      </p:ext>
+    </p:extLst>
+  </p:cSld>
+  <p:clrMapOvr>
+    <a:masterClrMapping/>
+  </p:clrMapOvr>
+</p:sld>
+</file>
+
+<file path=ppt/slides/slide9.xml><?xml version="1.0" encoding="utf-8"?>
+<p:sld xmlns:a="http://schemas.openxmlformats.org/drawingml/2006/main" xmlns:r="http://schemas.openxmlformats.org/officeDocument/2006/relationships" xmlns:p="http://schemas.openxmlformats.org/presentationml/2006/main">
+  <p:cSld>
+    <p:spTree>
+      <p:nvGrpSpPr>
+        <p:cNvPr id="1" name=""/>
+        <p:cNvGrpSpPr/>
+        <p:nvPr/>
+      </p:nvGrpSpPr>
+      <p:grpSpPr>
+        <a:xfrm>
+          <a:off x="0" y="0"/>
+          <a:ext cx="0" cy="0"/>
+          <a:chOff x="0" y="0"/>
+          <a:chExt cx="0" cy="0"/>
+        </a:xfrm>
+      </p:grpSpPr>
+      <p:sp>
+        <p:nvSpPr>
+          <p:cNvPr id="2" name="Title 1">
+            <a:extLst>
+              <a:ext uri="{FF2B5EF4-FFF2-40B4-BE49-F238E27FC236}">
                 <a16:creationId xmlns:a16="http://schemas.microsoft.com/office/drawing/2014/main" id="{1146158E-0745-8645-80A8-3BCE14C10D43}"/>
               </a:ext>
             </a:extLst>
@@ -6914,155 +7143,6 @@
     <p:extLst>
       <p:ext uri="{BB962C8B-B14F-4D97-AF65-F5344CB8AC3E}">
         <p14:creationId xmlns:p14="http://schemas.microsoft.com/office/powerpoint/2010/main" val="1099118766"/>
-      </p:ext>
-    </p:extLst>
-  </p:cSld>
-  <p:clrMapOvr>
-    <a:masterClrMapping/>
-  </p:clrMapOvr>
-</p:sld>
-</file>
-
-<file path=ppt/slides/slide9.xml><?xml version="1.0" encoding="utf-8"?>
-<p:sld xmlns:a="http://schemas.openxmlformats.org/drawingml/2006/main" xmlns:r="http://schemas.openxmlformats.org/officeDocument/2006/relationships" xmlns:p="http://schemas.openxmlformats.org/presentationml/2006/main">
-  <p:cSld>
-    <p:spTree>
-      <p:nvGrpSpPr>
-        <p:cNvPr id="1" name=""/>
-        <p:cNvGrpSpPr/>
-        <p:nvPr/>
-      </p:nvGrpSpPr>
-      <p:grpSpPr>
-        <a:xfrm>
-          <a:off x="0" y="0"/>
-          <a:ext cx="0" cy="0"/>
-          <a:chOff x="0" y="0"/>
-          <a:chExt cx="0" cy="0"/>
-        </a:xfrm>
-      </p:grpSpPr>
-      <p:sp>
-        <p:nvSpPr>
-          <p:cNvPr id="2" name="Title 1">
-            <a:extLst>
-              <a:ext uri="{FF2B5EF4-FFF2-40B4-BE49-F238E27FC236}">
-                <a16:creationId xmlns:a16="http://schemas.microsoft.com/office/drawing/2014/main" id="{F7A0676D-85F6-6A45-B13D-B6F3660769C1}"/>
-              </a:ext>
-            </a:extLst>
-          </p:cNvPr>
-          <p:cNvSpPr>
-            <a:spLocks noGrp="1"/>
-          </p:cNvSpPr>
-          <p:nvPr>
-            <p:ph type="title"/>
-          </p:nvPr>
-        </p:nvSpPr>
-        <p:spPr/>
-        <p:txBody>
-          <a:bodyPr/>
-          <a:lstStyle/>
-          <a:p>
-            <a:r>
-              <a:rPr lang="en-US" dirty="0"/>
-              <a:t>Research Plan</a:t>
-            </a:r>
-          </a:p>
-        </p:txBody>
-      </p:sp>
-      <p:sp>
-        <p:nvSpPr>
-          <p:cNvPr id="3" name="Content Placeholder 2">
-            <a:extLst>
-              <a:ext uri="{FF2B5EF4-FFF2-40B4-BE49-F238E27FC236}">
-                <a16:creationId xmlns:a16="http://schemas.microsoft.com/office/drawing/2014/main" id="{38AB196A-6CC0-824C-B204-E34D59126EE8}"/>
-              </a:ext>
-            </a:extLst>
-          </p:cNvPr>
-          <p:cNvSpPr>
-            <a:spLocks noGrp="1"/>
-          </p:cNvSpPr>
-          <p:nvPr>
-            <p:ph idx="1"/>
-          </p:nvPr>
-        </p:nvSpPr>
-        <p:spPr>
-          <a:xfrm>
-            <a:off x="838200" y="1825625"/>
-            <a:ext cx="11049000" cy="4351338"/>
-          </a:xfrm>
-        </p:spPr>
-        <p:txBody>
-          <a:bodyPr>
-            <a:normAutofit fontScale="92500" lnSpcReduction="10000"/>
-          </a:bodyPr>
-          <a:lstStyle/>
-          <a:p>
-            <a:r>
-              <a:rPr lang="en-US" dirty="0"/>
-              <a:t>Dec.9 –Dec.16: finish validation, think about sensitivity implementation</a:t>
-            </a:r>
-          </a:p>
-          <a:p>
-            <a:r>
-              <a:rPr lang="en-US" dirty="0"/>
-              <a:t>Dec.16-Dec.23: sensitivity design and implementation, methods write up</a:t>
-            </a:r>
-          </a:p>
-          <a:p>
-            <a:r>
-              <a:rPr lang="en-US" dirty="0"/>
-              <a:t>Dec.23-Jan.6: running sensitivity</a:t>
-            </a:r>
-          </a:p>
-          <a:p>
-            <a:r>
-              <a:rPr lang="en-US" dirty="0"/>
-              <a:t>Jan.6-Jan.13: sensitivity result, results write up</a:t>
-            </a:r>
-          </a:p>
-          <a:p>
-            <a:pPr marL="0" indent="0">
-              <a:buNone/>
-            </a:pPr>
-            <a:endParaRPr lang="en-US" dirty="0"/>
-          </a:p>
-          <a:p>
-            <a:r>
-              <a:rPr lang="en-US" altLang="zh-CN" dirty="0"/>
-              <a:t>Total .</a:t>
-            </a:r>
-            <a:r>
-              <a:rPr lang="en-US" dirty="0"/>
-              <a:t>Hydro power, it’s okay</a:t>
-            </a:r>
-          </a:p>
-          <a:p>
-            <a:r>
-              <a:rPr lang="en-US" dirty="0"/>
-              <a:t>Do annual generation check, after the validation, and run the sensitivity:</a:t>
-            </a:r>
-          </a:p>
-          <a:p>
-            <a:pPr lvl="1"/>
-            <a:r>
-              <a:rPr lang="en-US" dirty="0"/>
-              <a:t>More renewables, and </a:t>
-            </a:r>
-          </a:p>
-          <a:p>
-            <a:r>
-              <a:rPr lang="en-US" dirty="0"/>
-              <a:t>Friday, we give validation result, 3pm, how to set up. Super Computer arch guide, might not make sense, send you directions.</a:t>
-            </a:r>
-          </a:p>
-          <a:p>
-            <a:endParaRPr lang="en-US" dirty="0"/>
-          </a:p>
-        </p:txBody>
-      </p:sp>
-    </p:spTree>
-    <p:extLst>
-      <p:ext uri="{BB962C8B-B14F-4D97-AF65-F5344CB8AC3E}">
-        <p14:creationId xmlns:p14="http://schemas.microsoft.com/office/powerpoint/2010/main" val="1708910471"/>
       </p:ext>
     </p:extLst>
   </p:cSld>

</xml_diff>